<commit_message>
Beta para mostrarle al jurado
</commit_message>
<xml_diff>
--- a/slides.pptx
+++ b/slides.pptx
@@ -5,12 +5,15 @@
     <p:sldMasterId id="2147483648" r:id="rId1"/>
   </p:sldMasterIdLst>
   <p:notesMasterIdLst>
-    <p:notesMasterId r:id="rId5"/>
+    <p:notesMasterId r:id="rId8"/>
   </p:notesMasterIdLst>
   <p:sldIdLst>
     <p:sldId id="258" r:id="rId2"/>
-    <p:sldId id="316" r:id="rId3"/>
-    <p:sldId id="317" r:id="rId4"/>
+    <p:sldId id="320" r:id="rId3"/>
+    <p:sldId id="319" r:id="rId4"/>
+    <p:sldId id="318" r:id="rId5"/>
+    <p:sldId id="316" r:id="rId6"/>
+    <p:sldId id="317" r:id="rId7"/>
   </p:sldIdLst>
   <p:sldSz cx="12192000" cy="6858000"/>
   <p:notesSz cx="6858000" cy="9144000"/>
@@ -465,6 +468,174 @@
     </a:lvl9pPr>
   </p:notesStyle>
 </p:notesMaster>
+</file>
+
+<file path=ppt/notesSlides/notesSlide1.xml><?xml version="1.0" encoding="utf-8"?>
+<p:notes xmlns:a="http://schemas.openxmlformats.org/drawingml/2006/main" xmlns:r="http://schemas.openxmlformats.org/officeDocument/2006/relationships" xmlns:p="http://schemas.openxmlformats.org/presentationml/2006/main">
+  <p:cSld>
+    <p:spTree>
+      <p:nvGrpSpPr>
+        <p:cNvPr id="1" name=""/>
+        <p:cNvGrpSpPr/>
+        <p:nvPr/>
+      </p:nvGrpSpPr>
+      <p:grpSpPr>
+        <a:xfrm>
+          <a:off x="0" y="0"/>
+          <a:ext cx="0" cy="0"/>
+          <a:chOff x="0" y="0"/>
+          <a:chExt cx="0" cy="0"/>
+        </a:xfrm>
+      </p:grpSpPr>
+      <p:sp>
+        <p:nvSpPr>
+          <p:cNvPr id="2" name="Marcador de imagen de diapositiva 1"/>
+          <p:cNvSpPr>
+            <a:spLocks noGrp="1" noRot="1" noChangeAspect="1"/>
+          </p:cNvSpPr>
+          <p:nvPr>
+            <p:ph type="sldImg"/>
+          </p:nvPr>
+        </p:nvSpPr>
+        <p:spPr/>
+      </p:sp>
+      <p:sp>
+        <p:nvSpPr>
+          <p:cNvPr id="3" name="Marcador de notas 2"/>
+          <p:cNvSpPr>
+            <a:spLocks noGrp="1"/>
+          </p:cNvSpPr>
+          <p:nvPr>
+            <p:ph type="body" idx="1"/>
+          </p:nvPr>
+        </p:nvSpPr>
+        <p:spPr/>
+        <p:txBody>
+          <a:bodyPr/>
+          <a:lstStyle/>
+          <a:p>
+            <a:endParaRPr lang="es-ES_tradnl"/>
+          </a:p>
+        </p:txBody>
+      </p:sp>
+      <p:sp>
+        <p:nvSpPr>
+          <p:cNvPr id="4" name="Marcador de número de diapositiva 3"/>
+          <p:cNvSpPr>
+            <a:spLocks noGrp="1"/>
+          </p:cNvSpPr>
+          <p:nvPr>
+            <p:ph type="sldNum" sz="quarter" idx="10"/>
+          </p:nvPr>
+        </p:nvSpPr>
+        <p:spPr/>
+        <p:txBody>
+          <a:bodyPr/>
+          <a:lstStyle/>
+          <a:p>
+            <a:fld id="{B1D64C99-C14C-C249-BC54-454A8F77F53B}" type="slidenum">
+              <a:rPr lang="es-ES_tradnl" smtClean="0"/>
+              <a:t>2</a:t>
+            </a:fld>
+            <a:endParaRPr lang="es-ES_tradnl"/>
+          </a:p>
+        </p:txBody>
+      </p:sp>
+    </p:spTree>
+    <p:extLst>
+      <p:ext uri="{BB962C8B-B14F-4D97-AF65-F5344CB8AC3E}">
+        <p14:creationId xmlns:p14="http://schemas.microsoft.com/office/powerpoint/2010/main" val="1857813199"/>
+      </p:ext>
+    </p:extLst>
+  </p:cSld>
+  <p:clrMapOvr>
+    <a:masterClrMapping/>
+  </p:clrMapOvr>
+</p:notes>
+</file>
+
+<file path=ppt/notesSlides/notesSlide2.xml><?xml version="1.0" encoding="utf-8"?>
+<p:notes xmlns:a="http://schemas.openxmlformats.org/drawingml/2006/main" xmlns:r="http://schemas.openxmlformats.org/officeDocument/2006/relationships" xmlns:p="http://schemas.openxmlformats.org/presentationml/2006/main">
+  <p:cSld>
+    <p:spTree>
+      <p:nvGrpSpPr>
+        <p:cNvPr id="1" name=""/>
+        <p:cNvGrpSpPr/>
+        <p:nvPr/>
+      </p:nvGrpSpPr>
+      <p:grpSpPr>
+        <a:xfrm>
+          <a:off x="0" y="0"/>
+          <a:ext cx="0" cy="0"/>
+          <a:chOff x="0" y="0"/>
+          <a:chExt cx="0" cy="0"/>
+        </a:xfrm>
+      </p:grpSpPr>
+      <p:sp>
+        <p:nvSpPr>
+          <p:cNvPr id="2" name="Marcador de imagen de diapositiva 1"/>
+          <p:cNvSpPr>
+            <a:spLocks noGrp="1" noRot="1" noChangeAspect="1"/>
+          </p:cNvSpPr>
+          <p:nvPr>
+            <p:ph type="sldImg"/>
+          </p:nvPr>
+        </p:nvSpPr>
+        <p:spPr/>
+      </p:sp>
+      <p:sp>
+        <p:nvSpPr>
+          <p:cNvPr id="3" name="Marcador de notas 2"/>
+          <p:cNvSpPr>
+            <a:spLocks noGrp="1"/>
+          </p:cNvSpPr>
+          <p:nvPr>
+            <p:ph type="body" idx="1"/>
+          </p:nvPr>
+        </p:nvSpPr>
+        <p:spPr/>
+        <p:txBody>
+          <a:bodyPr/>
+          <a:lstStyle/>
+          <a:p>
+            <a:endParaRPr lang="es-ES_tradnl"/>
+          </a:p>
+        </p:txBody>
+      </p:sp>
+      <p:sp>
+        <p:nvSpPr>
+          <p:cNvPr id="4" name="Marcador de número de diapositiva 3"/>
+          <p:cNvSpPr>
+            <a:spLocks noGrp="1"/>
+          </p:cNvSpPr>
+          <p:nvPr>
+            <p:ph type="sldNum" sz="quarter" idx="10"/>
+          </p:nvPr>
+        </p:nvSpPr>
+        <p:spPr/>
+        <p:txBody>
+          <a:bodyPr/>
+          <a:lstStyle/>
+          <a:p>
+            <a:fld id="{B1D64C99-C14C-C249-BC54-454A8F77F53B}" type="slidenum">
+              <a:rPr lang="es-ES_tradnl" smtClean="0"/>
+              <a:t>3</a:t>
+            </a:fld>
+            <a:endParaRPr lang="es-ES_tradnl"/>
+          </a:p>
+        </p:txBody>
+      </p:sp>
+    </p:spTree>
+    <p:extLst>
+      <p:ext uri="{BB962C8B-B14F-4D97-AF65-F5344CB8AC3E}">
+        <p14:creationId xmlns:p14="http://schemas.microsoft.com/office/powerpoint/2010/main" val="2087832995"/>
+      </p:ext>
+    </p:extLst>
+  </p:cSld>
+  <p:clrMapOvr>
+    <a:masterClrMapping/>
+  </p:clrMapOvr>
+</p:notes>
 </file>
 
 <file path=ppt/slideLayouts/slideLayout1.xml><?xml version="1.0" encoding="utf-8"?>
@@ -3408,6 +3579,312 @@
           <p:nvPr/>
         </p:nvPicPr>
         <p:blipFill>
+          <a:blip r:embed="rId3">
+            <a:extLst>
+              <a:ext uri="{28A0092B-C50C-407E-A947-70E740481C1C}">
+                <a14:useLocalDpi xmlns:a14="http://schemas.microsoft.com/office/drawing/2010/main" val="0"/>
+              </a:ext>
+            </a:extLst>
+          </a:blip>
+          <a:stretch>
+            <a:fillRect/>
+          </a:stretch>
+        </p:blipFill>
+        <p:spPr>
+          <a:xfrm>
+            <a:off x="0" y="0"/>
+            <a:ext cx="12192000" cy="6857641"/>
+          </a:xfrm>
+          <a:prstGeom prst="rect">
+            <a:avLst/>
+          </a:prstGeom>
+        </p:spPr>
+      </p:pic>
+      <p:sp>
+        <p:nvSpPr>
+          <p:cNvPr id="7" name="CuadroTexto 6"/>
+          <p:cNvSpPr txBox="1"/>
+          <p:nvPr/>
+        </p:nvSpPr>
+        <p:spPr>
+          <a:xfrm>
+            <a:off x="-1121664" y="2561885"/>
+            <a:ext cx="12917315" cy="1569660"/>
+          </a:xfrm>
+          <a:prstGeom prst="rect">
+            <a:avLst/>
+          </a:prstGeom>
+          <a:noFill/>
+        </p:spPr>
+        <p:txBody>
+          <a:bodyPr wrap="square" rtlCol="0">
+            <a:spAutoFit/>
+          </a:bodyPr>
+          <a:lstStyle/>
+          <a:p>
+            <a:pPr algn="ctr"/>
+            <a:r>
+              <a:rPr lang="es-ES_tradnl" sz="9600" b="1" smtClean="0">
+                <a:solidFill>
+                  <a:schemeClr val="bg1"/>
+                </a:solidFill>
+                <a:latin typeface="Helvetica Neue" charset="0"/>
+                <a:ea typeface="Helvetica Neue" charset="0"/>
+                <a:cs typeface="Helvetica Neue" charset="0"/>
+              </a:rPr>
+              <a:t>nuestro</a:t>
+            </a:r>
+            <a:r>
+              <a:rPr lang="es-ES_tradnl" sz="9600" smtClean="0">
+                <a:solidFill>
+                  <a:schemeClr val="bg1"/>
+                </a:solidFill>
+                <a:latin typeface="Helvetica Neue" charset="0"/>
+                <a:ea typeface="Helvetica Neue" charset="0"/>
+                <a:cs typeface="Helvetica Neue" charset="0"/>
+              </a:rPr>
+              <a:t>producto</a:t>
+            </a:r>
+            <a:endParaRPr lang="es-ES_tradnl" sz="6600" dirty="0">
+              <a:solidFill>
+                <a:schemeClr val="bg1"/>
+              </a:solidFill>
+              <a:latin typeface="Helvetica Neue" charset="0"/>
+              <a:ea typeface="Helvetica Neue" charset="0"/>
+              <a:cs typeface="Helvetica Neue" charset="0"/>
+            </a:endParaRPr>
+          </a:p>
+        </p:txBody>
+      </p:sp>
+      <p:pic>
+        <p:nvPicPr>
+          <p:cNvPr id="8" name="Imagen 7"/>
+          <p:cNvPicPr>
+            <a:picLocks noChangeAspect="1"/>
+          </p:cNvPicPr>
+          <p:nvPr/>
+        </p:nvPicPr>
+        <p:blipFill>
+          <a:blip r:embed="rId4">
+            <a:extLst>
+              <a:ext uri="{28A0092B-C50C-407E-A947-70E740481C1C}">
+                <a14:useLocalDpi xmlns:a14="http://schemas.microsoft.com/office/drawing/2010/main" val="0"/>
+              </a:ext>
+            </a:extLst>
+          </a:blip>
+          <a:stretch>
+            <a:fillRect/>
+          </a:stretch>
+        </p:blipFill>
+        <p:spPr>
+          <a:xfrm>
+            <a:off x="543158" y="3014578"/>
+            <a:ext cx="2023366" cy="926020"/>
+          </a:xfrm>
+          <a:prstGeom prst="rect">
+            <a:avLst/>
+          </a:prstGeom>
+        </p:spPr>
+      </p:pic>
+    </p:spTree>
+    <p:extLst>
+      <p:ext uri="{BB962C8B-B14F-4D97-AF65-F5344CB8AC3E}">
+        <p14:creationId xmlns:p14="http://schemas.microsoft.com/office/powerpoint/2010/main" val="284022519"/>
+      </p:ext>
+    </p:extLst>
+  </p:cSld>
+  <p:clrMapOvr>
+    <a:masterClrMapping/>
+  </p:clrMapOvr>
+  <p:timing>
+    <p:tnLst>
+      <p:par>
+        <p:cTn id="1" dur="indefinite" restart="never" nodeType="tmRoot"/>
+      </p:par>
+    </p:tnLst>
+  </p:timing>
+</p:sld>
+</file>
+
+<file path=ppt/slides/slide3.xml><?xml version="1.0" encoding="utf-8"?>
+<p:sld xmlns:a="http://schemas.openxmlformats.org/drawingml/2006/main" xmlns:r="http://schemas.openxmlformats.org/officeDocument/2006/relationships" xmlns:p="http://schemas.openxmlformats.org/presentationml/2006/main">
+  <p:cSld>
+    <p:spTree>
+      <p:nvGrpSpPr>
+        <p:cNvPr id="1" name=""/>
+        <p:cNvGrpSpPr/>
+        <p:nvPr/>
+      </p:nvGrpSpPr>
+      <p:grpSpPr>
+        <a:xfrm>
+          <a:off x="0" y="0"/>
+          <a:ext cx="0" cy="0"/>
+          <a:chOff x="0" y="0"/>
+          <a:chExt cx="0" cy="0"/>
+        </a:xfrm>
+      </p:grpSpPr>
+      <p:pic>
+        <p:nvPicPr>
+          <p:cNvPr id="5" name="Imagen 4"/>
+          <p:cNvPicPr>
+            <a:picLocks noChangeAspect="1"/>
+          </p:cNvPicPr>
+          <p:nvPr/>
+        </p:nvPicPr>
+        <p:blipFill>
+          <a:blip r:embed="rId3">
+            <a:extLst>
+              <a:ext uri="{28A0092B-C50C-407E-A947-70E740481C1C}">
+                <a14:useLocalDpi xmlns:a14="http://schemas.microsoft.com/office/drawing/2010/main" val="0"/>
+              </a:ext>
+            </a:extLst>
+          </a:blip>
+          <a:stretch>
+            <a:fillRect/>
+          </a:stretch>
+        </p:blipFill>
+        <p:spPr>
+          <a:xfrm>
+            <a:off x="0" y="0"/>
+            <a:ext cx="12192000" cy="6857641"/>
+          </a:xfrm>
+          <a:prstGeom prst="rect">
+            <a:avLst/>
+          </a:prstGeom>
+        </p:spPr>
+      </p:pic>
+      <p:sp>
+        <p:nvSpPr>
+          <p:cNvPr id="7" name="CuadroTexto 6"/>
+          <p:cNvSpPr txBox="1"/>
+          <p:nvPr/>
+        </p:nvSpPr>
+        <p:spPr>
+          <a:xfrm>
+            <a:off x="2566524" y="2561885"/>
+            <a:ext cx="9229127" cy="1569660"/>
+          </a:xfrm>
+          <a:prstGeom prst="rect">
+            <a:avLst/>
+          </a:prstGeom>
+          <a:noFill/>
+        </p:spPr>
+        <p:txBody>
+          <a:bodyPr wrap="square" rtlCol="0">
+            <a:spAutoFit/>
+          </a:bodyPr>
+          <a:lstStyle/>
+          <a:p>
+            <a:pPr algn="ctr"/>
+            <a:r>
+              <a:rPr lang="es-ES_tradnl" sz="9600" b="1" dirty="0" smtClean="0">
+                <a:solidFill>
+                  <a:schemeClr val="bg1"/>
+                </a:solidFill>
+                <a:latin typeface="Helvetica Neue" charset="0"/>
+                <a:ea typeface="Helvetica Neue" charset="0"/>
+                <a:cs typeface="Helvetica Neue" charset="0"/>
+              </a:rPr>
+              <a:t>quiénes </a:t>
+            </a:r>
+            <a:r>
+              <a:rPr lang="es-ES_tradnl" sz="9600" dirty="0" smtClean="0">
+                <a:solidFill>
+                  <a:schemeClr val="bg1"/>
+                </a:solidFill>
+                <a:latin typeface="Helvetica Neue" charset="0"/>
+                <a:ea typeface="Helvetica Neue" charset="0"/>
+                <a:cs typeface="Helvetica Neue" charset="0"/>
+              </a:rPr>
+              <a:t>somos</a:t>
+            </a:r>
+            <a:endParaRPr lang="es-ES_tradnl" sz="6600" dirty="0">
+              <a:solidFill>
+                <a:schemeClr val="bg1"/>
+              </a:solidFill>
+              <a:latin typeface="Helvetica Neue" charset="0"/>
+              <a:ea typeface="Helvetica Neue" charset="0"/>
+              <a:cs typeface="Helvetica Neue" charset="0"/>
+            </a:endParaRPr>
+          </a:p>
+        </p:txBody>
+      </p:sp>
+      <p:pic>
+        <p:nvPicPr>
+          <p:cNvPr id="8" name="Imagen 7"/>
+          <p:cNvPicPr>
+            <a:picLocks noChangeAspect="1"/>
+          </p:cNvPicPr>
+          <p:nvPr/>
+        </p:nvPicPr>
+        <p:blipFill>
+          <a:blip r:embed="rId4">
+            <a:extLst>
+              <a:ext uri="{28A0092B-C50C-407E-A947-70E740481C1C}">
+                <a14:useLocalDpi xmlns:a14="http://schemas.microsoft.com/office/drawing/2010/main" val="0"/>
+              </a:ext>
+            </a:extLst>
+          </a:blip>
+          <a:stretch>
+            <a:fillRect/>
+          </a:stretch>
+        </p:blipFill>
+        <p:spPr>
+          <a:xfrm>
+            <a:off x="543158" y="3014578"/>
+            <a:ext cx="2023366" cy="926020"/>
+          </a:xfrm>
+          <a:prstGeom prst="rect">
+            <a:avLst/>
+          </a:prstGeom>
+        </p:spPr>
+      </p:pic>
+    </p:spTree>
+    <p:extLst>
+      <p:ext uri="{BB962C8B-B14F-4D97-AF65-F5344CB8AC3E}">
+        <p14:creationId xmlns:p14="http://schemas.microsoft.com/office/powerpoint/2010/main" val="320952955"/>
+      </p:ext>
+    </p:extLst>
+  </p:cSld>
+  <p:clrMapOvr>
+    <a:masterClrMapping/>
+  </p:clrMapOvr>
+  <p:timing>
+    <p:tnLst>
+      <p:par>
+        <p:cTn id="1" dur="indefinite" restart="never" nodeType="tmRoot"/>
+      </p:par>
+    </p:tnLst>
+  </p:timing>
+</p:sld>
+</file>
+
+<file path=ppt/slides/slide4.xml><?xml version="1.0" encoding="utf-8"?>
+<p:sld xmlns:a="http://schemas.openxmlformats.org/drawingml/2006/main" xmlns:r="http://schemas.openxmlformats.org/officeDocument/2006/relationships" xmlns:p="http://schemas.openxmlformats.org/presentationml/2006/main">
+  <p:cSld>
+    <p:spTree>
+      <p:nvGrpSpPr>
+        <p:cNvPr id="1" name=""/>
+        <p:cNvGrpSpPr/>
+        <p:nvPr/>
+      </p:nvGrpSpPr>
+      <p:grpSpPr>
+        <a:xfrm>
+          <a:off x="0" y="0"/>
+          <a:ext cx="0" cy="0"/>
+          <a:chOff x="0" y="0"/>
+          <a:chExt cx="0" cy="0"/>
+        </a:xfrm>
+      </p:grpSpPr>
+      <p:pic>
+        <p:nvPicPr>
+          <p:cNvPr id="5" name="Imagen 4"/>
+          <p:cNvPicPr>
+            <a:picLocks noChangeAspect="1"/>
+          </p:cNvPicPr>
+          <p:nvPr/>
+        </p:nvPicPr>
+        <p:blipFill>
           <a:blip r:embed="rId2">
             <a:extLst>
               <a:ext uri="{28A0092B-C50C-407E-A947-70E740481C1C}">
@@ -3431,13 +3908,289 @@
       </p:pic>
       <p:sp>
         <p:nvSpPr>
+          <p:cNvPr id="4" name="CuadroTexto 3"/>
+          <p:cNvSpPr txBox="1"/>
+          <p:nvPr/>
+        </p:nvSpPr>
+        <p:spPr>
+          <a:xfrm>
+            <a:off x="7419787" y="5500113"/>
+            <a:ext cx="3387466" cy="461665"/>
+          </a:xfrm>
+          <a:prstGeom prst="rect">
+            <a:avLst/>
+          </a:prstGeom>
+          <a:noFill/>
+        </p:spPr>
+        <p:txBody>
+          <a:bodyPr wrap="none" rtlCol="0">
+            <a:spAutoFit/>
+          </a:bodyPr>
+          <a:lstStyle/>
+          <a:p>
+            <a:pPr algn="ctr"/>
+            <a:r>
+              <a:rPr lang="es-ES_tradnl" sz="2400" dirty="0" err="1" smtClean="0">
+                <a:solidFill>
+                  <a:schemeClr val="bg1"/>
+                </a:solidFill>
+                <a:latin typeface="Helvetica Neue" charset="0"/>
+                <a:ea typeface="Helvetica Neue" charset="0"/>
+                <a:cs typeface="Helvetica Neue" charset="0"/>
+              </a:rPr>
+              <a:t>semantic</a:t>
+            </a:r>
+            <a:r>
+              <a:rPr lang="es-ES_tradnl" sz="2400" dirty="0" smtClean="0">
+                <a:solidFill>
+                  <a:schemeClr val="bg1"/>
+                </a:solidFill>
+                <a:latin typeface="Helvetica Neue" charset="0"/>
+                <a:ea typeface="Helvetica Neue" charset="0"/>
+                <a:cs typeface="Helvetica Neue" charset="0"/>
+              </a:rPr>
+              <a:t> </a:t>
+            </a:r>
+            <a:r>
+              <a:rPr lang="es-ES_tradnl" sz="2400" dirty="0" err="1" smtClean="0">
+                <a:solidFill>
+                  <a:schemeClr val="bg1"/>
+                </a:solidFill>
+                <a:latin typeface="Helvetica Neue" charset="0"/>
+                <a:ea typeface="Helvetica Neue" charset="0"/>
+                <a:cs typeface="Helvetica Neue" charset="0"/>
+              </a:rPr>
+              <a:t>segmentation</a:t>
+            </a:r>
+            <a:endParaRPr lang="es-ES_tradnl" sz="1400" dirty="0">
+              <a:solidFill>
+                <a:schemeClr val="bg1"/>
+              </a:solidFill>
+              <a:latin typeface="Helvetica Neue" charset="0"/>
+              <a:ea typeface="Helvetica Neue" charset="0"/>
+              <a:cs typeface="Helvetica Neue" charset="0"/>
+            </a:endParaRPr>
+          </a:p>
+        </p:txBody>
+      </p:sp>
+      <p:sp>
+        <p:nvSpPr>
+          <p:cNvPr id="6" name="CuadroTexto 5"/>
+          <p:cNvSpPr txBox="1"/>
+          <p:nvPr/>
+        </p:nvSpPr>
+        <p:spPr>
+          <a:xfrm>
+            <a:off x="7518211" y="5882955"/>
+            <a:ext cx="3147208" cy="461665"/>
+          </a:xfrm>
+          <a:prstGeom prst="rect">
+            <a:avLst/>
+          </a:prstGeom>
+          <a:noFill/>
+        </p:spPr>
+        <p:txBody>
+          <a:bodyPr wrap="none" rtlCol="0">
+            <a:spAutoFit/>
+          </a:bodyPr>
+          <a:lstStyle/>
+          <a:p>
+            <a:pPr algn="ctr"/>
+            <a:r>
+              <a:rPr lang="es-ES_tradnl" sz="2400" dirty="0" err="1" smtClean="0">
+                <a:solidFill>
+                  <a:schemeClr val="bg1"/>
+                </a:solidFill>
+                <a:latin typeface="Helvetica Neue" charset="0"/>
+                <a:ea typeface="Helvetica Neue" charset="0"/>
+                <a:cs typeface="Helvetica Neue" charset="0"/>
+              </a:rPr>
+              <a:t>foreground</a:t>
+            </a:r>
+            <a:r>
+              <a:rPr lang="es-ES_tradnl" sz="2400" dirty="0" smtClean="0">
+                <a:solidFill>
+                  <a:schemeClr val="bg1"/>
+                </a:solidFill>
+                <a:latin typeface="Helvetica Neue" charset="0"/>
+                <a:ea typeface="Helvetica Neue" charset="0"/>
+                <a:cs typeface="Helvetica Neue" charset="0"/>
+              </a:rPr>
+              <a:t> </a:t>
+            </a:r>
+            <a:r>
+              <a:rPr lang="es-ES_tradnl" sz="2400" dirty="0" err="1" smtClean="0">
+                <a:solidFill>
+                  <a:schemeClr val="bg1"/>
+                </a:solidFill>
+                <a:latin typeface="Helvetica Neue" charset="0"/>
+                <a:ea typeface="Helvetica Neue" charset="0"/>
+                <a:cs typeface="Helvetica Neue" charset="0"/>
+              </a:rPr>
+              <a:t>detection</a:t>
+            </a:r>
+            <a:endParaRPr lang="es-ES_tradnl" sz="1400" dirty="0">
+              <a:solidFill>
+                <a:schemeClr val="bg1"/>
+              </a:solidFill>
+              <a:latin typeface="Helvetica Neue" charset="0"/>
+              <a:ea typeface="Helvetica Neue" charset="0"/>
+              <a:cs typeface="Helvetica Neue" charset="0"/>
+            </a:endParaRPr>
+          </a:p>
+        </p:txBody>
+      </p:sp>
+      <p:sp>
+        <p:nvSpPr>
+          <p:cNvPr id="7" name="CuadroTexto 6"/>
+          <p:cNvSpPr txBox="1"/>
+          <p:nvPr/>
+        </p:nvSpPr>
+        <p:spPr>
+          <a:xfrm>
+            <a:off x="851577" y="1525565"/>
+            <a:ext cx="5767926" cy="646331"/>
+          </a:xfrm>
+          <a:prstGeom prst="rect">
+            <a:avLst/>
+          </a:prstGeom>
+          <a:noFill/>
+        </p:spPr>
+        <p:txBody>
+          <a:bodyPr wrap="none" rtlCol="0">
+            <a:spAutoFit/>
+          </a:bodyPr>
+          <a:lstStyle/>
+          <a:p>
+            <a:pPr algn="ctr"/>
+            <a:r>
+              <a:rPr lang="es-ES_tradnl" sz="3600" b="1" dirty="0" smtClean="0">
+                <a:solidFill>
+                  <a:schemeClr val="bg1"/>
+                </a:solidFill>
+                <a:latin typeface="Helvetica Neue" charset="0"/>
+                <a:ea typeface="Helvetica Neue" charset="0"/>
+                <a:cs typeface="Helvetica Neue" charset="0"/>
+              </a:rPr>
+              <a:t>detección automática de </a:t>
+            </a:r>
+            <a:endParaRPr lang="es-ES_tradnl" sz="2000" b="1" dirty="0">
+              <a:solidFill>
+                <a:schemeClr val="bg1"/>
+              </a:solidFill>
+              <a:latin typeface="Helvetica Neue" charset="0"/>
+              <a:ea typeface="Helvetica Neue" charset="0"/>
+              <a:cs typeface="Helvetica Neue" charset="0"/>
+            </a:endParaRPr>
+          </a:p>
+        </p:txBody>
+      </p:sp>
+      <p:pic>
+        <p:nvPicPr>
+          <p:cNvPr id="8" name="Imagen 7"/>
+          <p:cNvPicPr>
+            <a:picLocks noChangeAspect="1"/>
+          </p:cNvPicPr>
+          <p:nvPr/>
+        </p:nvPicPr>
+        <p:blipFill>
+          <a:blip r:embed="rId3">
+            <a:extLst>
+              <a:ext uri="{28A0092B-C50C-407E-A947-70E740481C1C}">
+                <a14:useLocalDpi xmlns:a14="http://schemas.microsoft.com/office/drawing/2010/main" val="0"/>
+              </a:ext>
+            </a:extLst>
+          </a:blip>
+          <a:stretch>
+            <a:fillRect/>
+          </a:stretch>
+        </p:blipFill>
+        <p:spPr>
+          <a:xfrm>
+            <a:off x="495301" y="412654"/>
+            <a:ext cx="1530071" cy="700257"/>
+          </a:xfrm>
+          <a:prstGeom prst="rect">
+            <a:avLst/>
+          </a:prstGeom>
+        </p:spPr>
+      </p:pic>
+    </p:spTree>
+    <p:extLst>
+      <p:ext uri="{BB962C8B-B14F-4D97-AF65-F5344CB8AC3E}">
+        <p14:creationId xmlns:p14="http://schemas.microsoft.com/office/powerpoint/2010/main" val="1451428800"/>
+      </p:ext>
+    </p:extLst>
+  </p:cSld>
+  <p:clrMapOvr>
+    <a:masterClrMapping/>
+  </p:clrMapOvr>
+  <p:timing>
+    <p:tnLst>
+      <p:par>
+        <p:cTn id="1" dur="indefinite" restart="never" nodeType="tmRoot"/>
+      </p:par>
+    </p:tnLst>
+  </p:timing>
+</p:sld>
+</file>
+
+<file path=ppt/slides/slide5.xml><?xml version="1.0" encoding="utf-8"?>
+<p:sld xmlns:a="http://schemas.openxmlformats.org/drawingml/2006/main" xmlns:r="http://schemas.openxmlformats.org/officeDocument/2006/relationships" xmlns:p="http://schemas.openxmlformats.org/presentationml/2006/main">
+  <p:cSld>
+    <p:spTree>
+      <p:nvGrpSpPr>
+        <p:cNvPr id="1" name=""/>
+        <p:cNvGrpSpPr/>
+        <p:nvPr/>
+      </p:nvGrpSpPr>
+      <p:grpSpPr>
+        <a:xfrm>
+          <a:off x="0" y="0"/>
+          <a:ext cx="0" cy="0"/>
+          <a:chOff x="0" y="0"/>
+          <a:chExt cx="0" cy="0"/>
+        </a:xfrm>
+      </p:grpSpPr>
+      <p:pic>
+        <p:nvPicPr>
+          <p:cNvPr id="5" name="Imagen 4"/>
+          <p:cNvPicPr>
+            <a:picLocks noChangeAspect="1"/>
+          </p:cNvPicPr>
+          <p:nvPr/>
+        </p:nvPicPr>
+        <p:blipFill>
+          <a:blip r:embed="rId2">
+            <a:extLst>
+              <a:ext uri="{28A0092B-C50C-407E-A947-70E740481C1C}">
+                <a14:useLocalDpi xmlns:a14="http://schemas.microsoft.com/office/drawing/2010/main" val="0"/>
+              </a:ext>
+            </a:extLst>
+          </a:blip>
+          <a:stretch>
+            <a:fillRect/>
+          </a:stretch>
+        </p:blipFill>
+        <p:spPr>
+          <a:xfrm>
+            <a:off x="0" y="0"/>
+            <a:ext cx="12192000" cy="6857641"/>
+          </a:xfrm>
+          <a:prstGeom prst="rect">
+            <a:avLst/>
+          </a:prstGeom>
+        </p:spPr>
+      </p:pic>
+      <p:sp>
+        <p:nvSpPr>
           <p:cNvPr id="2" name="CuadroTexto 1"/>
           <p:cNvSpPr txBox="1"/>
           <p:nvPr/>
         </p:nvSpPr>
         <p:spPr>
           <a:xfrm>
-            <a:off x="4500691" y="1637731"/>
+            <a:off x="7518211" y="4853782"/>
             <a:ext cx="3190618" cy="646331"/>
           </a:xfrm>
           <a:prstGeom prst="rect">
@@ -3504,7 +4257,7 @@
         </p:nvSpPr>
         <p:spPr>
           <a:xfrm>
-            <a:off x="4402267" y="2284062"/>
+            <a:off x="7419787" y="5500113"/>
             <a:ext cx="3387466" cy="461665"/>
           </a:xfrm>
           <a:prstGeom prst="rect">
@@ -3571,7 +4324,7 @@
         </p:nvSpPr>
         <p:spPr>
           <a:xfrm>
-            <a:off x="4500691" y="2666904"/>
+            <a:off x="7518211" y="5882955"/>
             <a:ext cx="3147208" cy="461665"/>
           </a:xfrm>
           <a:prstGeom prst="rect">
@@ -3587,7 +4340,7 @@
           <a:p>
             <a:pPr algn="ctr"/>
             <a:r>
-              <a:rPr lang="es-ES_tradnl" sz="2400" smtClean="0">
+              <a:rPr lang="es-ES_tradnl" sz="2400" dirty="0" err="1" smtClean="0">
                 <a:solidFill>
                   <a:schemeClr val="bg1"/>
                 </a:solidFill>
@@ -3638,7 +4391,7 @@
         </p:nvSpPr>
         <p:spPr>
           <a:xfrm>
-            <a:off x="3620803" y="3601355"/>
+            <a:off x="6677511" y="3173801"/>
             <a:ext cx="4950394" cy="646331"/>
           </a:xfrm>
           <a:prstGeom prst="rect">
@@ -3697,6 +4450,66 @@
           </a:p>
         </p:txBody>
       </p:sp>
+      <p:pic>
+        <p:nvPicPr>
+          <p:cNvPr id="8" name="Imagen 7"/>
+          <p:cNvPicPr>
+            <a:picLocks noChangeAspect="1"/>
+          </p:cNvPicPr>
+          <p:nvPr/>
+        </p:nvPicPr>
+        <p:blipFill>
+          <a:blip r:embed="rId3">
+            <a:extLst>
+              <a:ext uri="{28A0092B-C50C-407E-A947-70E740481C1C}">
+                <a14:useLocalDpi xmlns:a14="http://schemas.microsoft.com/office/drawing/2010/main" val="0"/>
+              </a:ext>
+            </a:extLst>
+          </a:blip>
+          <a:stretch>
+            <a:fillRect/>
+          </a:stretch>
+        </p:blipFill>
+        <p:spPr>
+          <a:xfrm>
+            <a:off x="730432" y="762783"/>
+            <a:ext cx="4307539" cy="1971402"/>
+          </a:xfrm>
+          <a:prstGeom prst="rect">
+            <a:avLst/>
+          </a:prstGeom>
+        </p:spPr>
+      </p:pic>
+      <p:pic>
+        <p:nvPicPr>
+          <p:cNvPr id="9" name="Imagen 8"/>
+          <p:cNvPicPr>
+            <a:picLocks noChangeAspect="1"/>
+          </p:cNvPicPr>
+          <p:nvPr/>
+        </p:nvPicPr>
+        <p:blipFill>
+          <a:blip r:embed="rId3">
+            <a:extLst>
+              <a:ext uri="{28A0092B-C50C-407E-A947-70E740481C1C}">
+                <a14:useLocalDpi xmlns:a14="http://schemas.microsoft.com/office/drawing/2010/main" val="0"/>
+              </a:ext>
+            </a:extLst>
+          </a:blip>
+          <a:stretch>
+            <a:fillRect/>
+          </a:stretch>
+        </p:blipFill>
+        <p:spPr>
+          <a:xfrm>
+            <a:off x="6998939" y="762783"/>
+            <a:ext cx="4307539" cy="1971402"/>
+          </a:xfrm>
+          <a:prstGeom prst="rect">
+            <a:avLst/>
+          </a:prstGeom>
+        </p:spPr>
+      </p:pic>
     </p:spTree>
     <p:extLst>
       <p:ext uri="{BB962C8B-B14F-4D97-AF65-F5344CB8AC3E}">
@@ -3717,7 +4530,7 @@
 </p:sld>
 </file>
 
-<file path=ppt/slides/slide3.xml><?xml version="1.0" encoding="utf-8"?>
+<file path=ppt/slides/slide6.xml><?xml version="1.0" encoding="utf-8"?>
 <p:sld xmlns:a="http://schemas.openxmlformats.org/drawingml/2006/main" xmlns:r="http://schemas.openxmlformats.org/officeDocument/2006/relationships" xmlns:p="http://schemas.openxmlformats.org/presentationml/2006/main">
   <p:cSld>
     <p:spTree>

</xml_diff>